<commit_message>
Updated slides after A01 lecture set
</commit_message>
<xml_diff>
--- a/Lecture slides/ADAP A01 - Introduction.pptx
+++ b/Lecture slides/ADAP A01 - Introduction.pptx
@@ -806,7 +806,7 @@
       </p:grpSpPr>
       <p:sp>
         <p:nvSpPr>
-          <p:cNvPr id="99" name="Google Shape;99;g30a7ab4b1dc_0_0:notes"/>
+          <p:cNvPr id="99" name="Google Shape;99;g108fe332759_2_43:notes"/>
           <p:cNvSpPr/>
           <p:nvPr>
             <p:ph idx="2" type="sldImg"/>
@@ -841,7 +841,7 @@
       </p:sp>
       <p:sp>
         <p:nvSpPr>
-          <p:cNvPr id="100" name="Google Shape;100;g30a7ab4b1dc_0_0:notes"/>
+          <p:cNvPr id="100" name="Google Shape;100;g108fe332759_2_43:notes"/>
           <p:cNvSpPr txBox="1"/>
           <p:nvPr>
             <p:ph idx="1" type="body"/>
@@ -891,7 +891,7 @@
   <p:cSld>
     <p:spTree>
       <p:nvGrpSpPr>
-        <p:cNvPr id="105" name="Shape 105"/>
+        <p:cNvPr id="106" name="Shape 106"/>
         <p:cNvGrpSpPr/>
         <p:nvPr/>
       </p:nvGrpSpPr>
@@ -905,7 +905,7 @@
       </p:grpSpPr>
       <p:sp>
         <p:nvSpPr>
-          <p:cNvPr id="106" name="Google Shape;106;g108fe332759_2_43:notes"/>
+          <p:cNvPr id="107" name="Google Shape;107;g2cc48c0d17f_0_12:notes"/>
           <p:cNvSpPr/>
           <p:nvPr>
             <p:ph idx="2" type="sldImg"/>
@@ -940,7 +940,7 @@
       </p:sp>
       <p:sp>
         <p:nvSpPr>
-          <p:cNvPr id="107" name="Google Shape;107;g108fe332759_2_43:notes"/>
+          <p:cNvPr id="108" name="Google Shape;108;g2cc48c0d17f_0_12:notes"/>
           <p:cNvSpPr txBox="1"/>
           <p:nvPr>
             <p:ph idx="1" type="body"/>
@@ -1004,7 +1004,7 @@
       </p:grpSpPr>
       <p:sp>
         <p:nvSpPr>
-          <p:cNvPr id="114" name="Google Shape;114;g2cc48c0d17f_0_12:notes"/>
+          <p:cNvPr id="114" name="Google Shape;114;g2cc48c0d17f_0_6:notes"/>
           <p:cNvSpPr/>
           <p:nvPr>
             <p:ph idx="2" type="sldImg"/>
@@ -1039,7 +1039,7 @@
       </p:sp>
       <p:sp>
         <p:nvSpPr>
-          <p:cNvPr id="115" name="Google Shape;115;g2cc48c0d17f_0_12:notes"/>
+          <p:cNvPr id="115" name="Google Shape;115;g2cc48c0d17f_0_6:notes"/>
           <p:cNvSpPr txBox="1"/>
           <p:nvPr>
             <p:ph idx="1" type="body"/>
@@ -1103,7 +1103,7 @@
       </p:grpSpPr>
       <p:sp>
         <p:nvSpPr>
-          <p:cNvPr id="121" name="Google Shape;121;g2cc48c0d17f_0_6:notes"/>
+          <p:cNvPr id="121" name="Google Shape;121;g2395919313b_0_94:notes"/>
           <p:cNvSpPr/>
           <p:nvPr>
             <p:ph idx="2" type="sldImg"/>
@@ -1138,7 +1138,7 @@
       </p:sp>
       <p:sp>
         <p:nvSpPr>
-          <p:cNvPr id="122" name="Google Shape;122;g2cc48c0d17f_0_6:notes"/>
+          <p:cNvPr id="122" name="Google Shape;122;g2395919313b_0_94:notes"/>
           <p:cNvSpPr txBox="1"/>
           <p:nvPr>
             <p:ph idx="1" type="body"/>
@@ -1188,7 +1188,7 @@
   <p:cSld>
     <p:spTree>
       <p:nvGrpSpPr>
-        <p:cNvPr id="127" name="Shape 127"/>
+        <p:cNvPr id="128" name="Shape 128"/>
         <p:cNvGrpSpPr/>
         <p:nvPr/>
       </p:nvGrpSpPr>
@@ -1202,7 +1202,7 @@
       </p:grpSpPr>
       <p:sp>
         <p:nvSpPr>
-          <p:cNvPr id="128" name="Google Shape;128;g2395919313b_0_94:notes"/>
+          <p:cNvPr id="129" name="Google Shape;129;g30a7ab4b1dc_0_0:notes"/>
           <p:cNvSpPr/>
           <p:nvPr>
             <p:ph idx="2" type="sldImg"/>
@@ -1237,7 +1237,7 @@
       </p:sp>
       <p:sp>
         <p:nvSpPr>
-          <p:cNvPr id="129" name="Google Shape;129;g2395919313b_0_94:notes"/>
+          <p:cNvPr id="130" name="Google Shape;130;g30a7ab4b1dc_0_0:notes"/>
           <p:cNvSpPr txBox="1"/>
           <p:nvPr>
             <p:ph idx="1" type="body"/>
@@ -6028,7 +6028,7 @@
             </a:pPr>
             <a:r>
               <a:rPr lang="en"/>
-              <a:t>Expectation Management (Winter 2024/25)</a:t>
+              <a:t>Course Language [1]</a:t>
             </a:r>
             <a:endParaRPr/>
           </a:p>
@@ -6104,6 +6104,61 @@
         <p:nvSpPr>
           <p:cNvPr id="104" name="Google Shape;104;p17"/>
           <p:cNvSpPr txBox="1"/>
+          <p:nvPr/>
+        </p:nvSpPr>
+        <p:spPr>
+          <a:xfrm>
+            <a:off x="0" y="4229100"/>
+            <a:ext cx="7315200" cy="914400"/>
+          </a:xfrm>
+          <a:prstGeom prst="rect">
+            <a:avLst/>
+          </a:prstGeom>
+          <a:noFill/>
+          <a:ln>
+            <a:noFill/>
+          </a:ln>
+        </p:spPr>
+        <p:txBody>
+          <a:bodyPr anchorCtr="0" anchor="b" bIns="91425" lIns="91425" spcFirstLastPara="1" rIns="91425" wrap="square" tIns="91425">
+            <a:noAutofit/>
+          </a:bodyPr>
+          <a:lstStyle/>
+          <a:p>
+            <a:pPr indent="0" lvl="0" marL="0" rtl="0" algn="l">
+              <a:spcBef>
+                <a:spcPts val="0"/>
+              </a:spcBef>
+              <a:spcAft>
+                <a:spcPts val="0"/>
+              </a:spcAft>
+              <a:buNone/>
+            </a:pPr>
+            <a:r>
+              <a:rPr lang="en"/>
+              <a:t>[1] See </a:t>
+            </a:r>
+            <a:r>
+              <a:rPr lang="en" u="sng">
+                <a:solidFill>
+                  <a:schemeClr val="hlink"/>
+                </a:solidFill>
+                <a:hlinkClick r:id="rId4"/>
+              </a:rPr>
+              <a:t>https://oss.cs.fau.de/2012/03/10/english-or-german-deutsch-oder-englisch/</a:t>
+            </a:r>
+            <a:r>
+              <a:rPr lang="en"/>
+              <a:t> </a:t>
+            </a:r>
+            <a:endParaRPr/>
+          </a:p>
+        </p:txBody>
+      </p:sp>
+      <p:sp>
+        <p:nvSpPr>
+          <p:cNvPr id="105" name="Google Shape;105;p17"/>
+          <p:cNvSpPr txBox="1"/>
           <p:nvPr>
             <p:ph idx="1" type="body"/>
           </p:nvPr>
@@ -6130,11 +6185,50 @@
               <a:spcAft>
                 <a:spcPts val="0"/>
               </a:spcAft>
-              <a:buNone/>
-            </a:pPr>
-            <a:r>
-              <a:rPr lang="en"/>
-              <a:t>We skipped ADAP last winter to migrate from Java to Typescript</a:t>
+              <a:buClr>
+                <a:schemeClr val="dk1"/>
+              </a:buClr>
+              <a:buSzPts val="1100"/>
+              <a:buFont typeface="Arial"/>
+              <a:buNone/>
+            </a:pPr>
+            <a:r>
+              <a:rPr b="1" lang="en"/>
+              <a:t>Class</a:t>
+            </a:r>
+            <a:endParaRPr b="1"/>
+          </a:p>
+          <a:p>
+            <a:pPr indent="-342900" lvl="0" marL="457200" rtl="0" algn="l">
+              <a:spcBef>
+                <a:spcPts val="1200"/>
+              </a:spcBef>
+              <a:spcAft>
+                <a:spcPts val="0"/>
+              </a:spcAft>
+              <a:buSzPts val="1800"/>
+              <a:buChar char="●"/>
+            </a:pPr>
+            <a:r>
+              <a:rPr lang="en"/>
+              <a:t>Lecturer: German</a:t>
+            </a:r>
+            <a:endParaRPr/>
+          </a:p>
+          <a:p>
+            <a:pPr indent="-342900" lvl="0" marL="457200" rtl="0" algn="l">
+              <a:spcBef>
+                <a:spcPts val="0"/>
+              </a:spcBef>
+              <a:spcAft>
+                <a:spcPts val="0"/>
+              </a:spcAft>
+              <a:buSzPts val="1800"/>
+              <a:buChar char="●"/>
+            </a:pPr>
+            <a:r>
+              <a:rPr lang="en"/>
+              <a:t>Student: Choice of German or English</a:t>
             </a:r>
             <a:endParaRPr/>
           </a:p>
@@ -6146,11 +6240,50 @@
               <a:spcAft>
                 <a:spcPts val="0"/>
               </a:spcAft>
-              <a:buNone/>
-            </a:pPr>
-            <a:r>
-              <a:rPr lang="en"/>
-              <a:t>We did not finish ADAP preparations; hence this instances is experimental</a:t>
+              <a:buClr>
+                <a:schemeClr val="dk1"/>
+              </a:buClr>
+              <a:buSzPts val="1100"/>
+              <a:buFont typeface="Arial"/>
+              <a:buNone/>
+            </a:pPr>
+            <a:r>
+              <a:rPr b="1" lang="en"/>
+              <a:t>Exercise</a:t>
+            </a:r>
+            <a:endParaRPr b="1"/>
+          </a:p>
+          <a:p>
+            <a:pPr indent="-342900" lvl="0" marL="457200" rtl="0" algn="l">
+              <a:spcBef>
+                <a:spcPts val="1200"/>
+              </a:spcBef>
+              <a:spcAft>
+                <a:spcPts val="0"/>
+              </a:spcAft>
+              <a:buSzPts val="1800"/>
+              <a:buChar char="●"/>
+            </a:pPr>
+            <a:r>
+              <a:rPr lang="en"/>
+              <a:t>Instructor: German</a:t>
+            </a:r>
+            <a:endParaRPr/>
+          </a:p>
+          <a:p>
+            <a:pPr indent="-342900" lvl="0" marL="457200" rtl="0" algn="l">
+              <a:spcBef>
+                <a:spcPts val="0"/>
+              </a:spcBef>
+              <a:spcAft>
+                <a:spcPts val="0"/>
+              </a:spcAft>
+              <a:buSzPts val="1800"/>
+              <a:buChar char="●"/>
+            </a:pPr>
+            <a:r>
+              <a:rPr lang="en"/>
+              <a:t>Homework: Choice of German or English</a:t>
             </a:r>
             <a:endParaRPr/>
           </a:p>
@@ -6160,29 +6293,12 @@
                 <a:spcPts val="1200"/>
               </a:spcBef>
               <a:spcAft>
-                <a:spcPts val="0"/>
-              </a:spcAft>
-              <a:buNone/>
-            </a:pPr>
-            <a:r>
-              <a:rPr lang="en"/>
-              <a:t>You will not receive any homework feedback during the course</a:t>
-            </a:r>
-            <a:endParaRPr/>
-          </a:p>
-          <a:p>
-            <a:pPr indent="0" lvl="0" marL="0" rtl="0" algn="l">
-              <a:spcBef>
                 <a:spcPts val="1200"/>
-              </a:spcBef>
-              <a:spcAft>
-                <a:spcPts val="1200"/>
-              </a:spcAft>
-              <a:buNone/>
-            </a:pPr>
-            <a:r>
-              <a:rPr lang="en"/>
-              <a:t>Please take note of these restrictions; we recommend you try next year</a:t>
+              </a:spcAft>
+              <a:buNone/>
+            </a:pPr>
+            <a:r>
+              <a:t/>
             </a:r>
             <a:endParaRPr/>
           </a:p>
@@ -6201,7 +6317,7 @@
   <p:cSld>
     <p:spTree>
       <p:nvGrpSpPr>
-        <p:cNvPr id="108" name="Shape 108"/>
+        <p:cNvPr id="109" name="Shape 109"/>
         <p:cNvGrpSpPr/>
         <p:nvPr/>
       </p:nvGrpSpPr>
@@ -6215,7 +6331,7 @@
       </p:grpSpPr>
       <p:sp>
         <p:nvSpPr>
-          <p:cNvPr id="109" name="Google Shape;109;p18"/>
+          <p:cNvPr id="110" name="Google Shape;110;p18"/>
           <p:cNvSpPr txBox="1"/>
           <p:nvPr>
             <p:ph type="title"/>
@@ -6247,7 +6363,7 @@
             </a:pPr>
             <a:r>
               <a:rPr lang="en"/>
-              <a:t>Course Language [1]</a:t>
+              <a:t>Course Participation (Auditing)</a:t>
             </a:r>
             <a:endParaRPr/>
           </a:p>
@@ -6255,7 +6371,63 @@
       </p:sp>
       <p:sp>
         <p:nvSpPr>
-          <p:cNvPr id="110" name="Google Shape;110;p18"/>
+          <p:cNvPr id="111" name="Google Shape;111;p18"/>
+          <p:cNvSpPr txBox="1"/>
+          <p:nvPr>
+            <p:ph idx="1" type="body"/>
+          </p:nvPr>
+        </p:nvSpPr>
+        <p:spPr>
+          <a:xfrm>
+            <a:off x="274320" y="914400"/>
+            <a:ext cx="8595300" cy="4114800"/>
+          </a:xfrm>
+          <a:prstGeom prst="rect">
+            <a:avLst/>
+          </a:prstGeom>
+        </p:spPr>
+        <p:txBody>
+          <a:bodyPr anchorCtr="0" anchor="t" bIns="0" lIns="0" spcFirstLastPara="1" rIns="0" wrap="square" tIns="0">
+            <a:noAutofit/>
+          </a:bodyPr>
+          <a:lstStyle/>
+          <a:p>
+            <a:pPr indent="0" lvl="0" marL="0" rtl="0" algn="l">
+              <a:spcBef>
+                <a:spcPts val="0"/>
+              </a:spcBef>
+              <a:spcAft>
+                <a:spcPts val="0"/>
+              </a:spcAft>
+              <a:buNone/>
+            </a:pPr>
+            <a:r>
+              <a:rPr lang="en"/>
+              <a:t>The course is provided publicly, you can always audit it</a:t>
+            </a:r>
+            <a:endParaRPr/>
+          </a:p>
+          <a:p>
+            <a:pPr indent="0" lvl="0" marL="0" rtl="0" algn="l">
+              <a:spcBef>
+                <a:spcPts val="1200"/>
+              </a:spcBef>
+              <a:spcAft>
+                <a:spcPts val="1200"/>
+              </a:spcAft>
+              <a:buNone/>
+            </a:pPr>
+            <a:r>
+              <a:rPr lang="en"/>
+              <a:t>Auditing will not give you credit points towards a degree</a:t>
+            </a:r>
+            <a:endParaRPr/>
+          </a:p>
+        </p:txBody>
+      </p:sp>
+      <p:sp>
+        <p:nvSpPr>
+          <p:cNvPr id="112" name="Google Shape;112;p18"/>
           <p:cNvSpPr txBox="1"/>
           <p:nvPr>
             <p:ph idx="12" type="sldNum"/>
@@ -6316,210 +6488,6 @@
               <a:t>https://profriehle.com</a:t>
             </a:r>
             <a:endParaRPr b="0" sz="1000"/>
-          </a:p>
-        </p:txBody>
-      </p:sp>
-      <p:sp>
-        <p:nvSpPr>
-          <p:cNvPr id="111" name="Google Shape;111;p18"/>
-          <p:cNvSpPr txBox="1"/>
-          <p:nvPr/>
-        </p:nvSpPr>
-        <p:spPr>
-          <a:xfrm>
-            <a:off x="0" y="4229100"/>
-            <a:ext cx="7315200" cy="914400"/>
-          </a:xfrm>
-          <a:prstGeom prst="rect">
-            <a:avLst/>
-          </a:prstGeom>
-          <a:noFill/>
-          <a:ln>
-            <a:noFill/>
-          </a:ln>
-        </p:spPr>
-        <p:txBody>
-          <a:bodyPr anchorCtr="0" anchor="b" bIns="91425" lIns="91425" spcFirstLastPara="1" rIns="91425" wrap="square" tIns="91425">
-            <a:noAutofit/>
-          </a:bodyPr>
-          <a:lstStyle/>
-          <a:p>
-            <a:pPr indent="0" lvl="0" marL="0" rtl="0" algn="l">
-              <a:spcBef>
-                <a:spcPts val="0"/>
-              </a:spcBef>
-              <a:spcAft>
-                <a:spcPts val="0"/>
-              </a:spcAft>
-              <a:buNone/>
-            </a:pPr>
-            <a:r>
-              <a:rPr lang="en"/>
-              <a:t>[1] See </a:t>
-            </a:r>
-            <a:r>
-              <a:rPr lang="en" u="sng">
-                <a:solidFill>
-                  <a:schemeClr val="hlink"/>
-                </a:solidFill>
-                <a:hlinkClick r:id="rId4"/>
-              </a:rPr>
-              <a:t>https://oss.cs.fau.de/2012/03/10/english-or-german-deutsch-oder-englisch/</a:t>
-            </a:r>
-            <a:r>
-              <a:rPr lang="en"/>
-              <a:t> </a:t>
-            </a:r>
-            <a:endParaRPr/>
-          </a:p>
-        </p:txBody>
-      </p:sp>
-      <p:sp>
-        <p:nvSpPr>
-          <p:cNvPr id="112" name="Google Shape;112;p18"/>
-          <p:cNvSpPr txBox="1"/>
-          <p:nvPr>
-            <p:ph idx="1" type="body"/>
-          </p:nvPr>
-        </p:nvSpPr>
-        <p:spPr>
-          <a:xfrm>
-            <a:off x="274320" y="914400"/>
-            <a:ext cx="8595300" cy="4114800"/>
-          </a:xfrm>
-          <a:prstGeom prst="rect">
-            <a:avLst/>
-          </a:prstGeom>
-        </p:spPr>
-        <p:txBody>
-          <a:bodyPr anchorCtr="0" anchor="t" bIns="0" lIns="0" spcFirstLastPara="1" rIns="0" wrap="square" tIns="0">
-            <a:noAutofit/>
-          </a:bodyPr>
-          <a:lstStyle/>
-          <a:p>
-            <a:pPr indent="0" lvl="0" marL="0" rtl="0" algn="l">
-              <a:spcBef>
-                <a:spcPts val="0"/>
-              </a:spcBef>
-              <a:spcAft>
-                <a:spcPts val="0"/>
-              </a:spcAft>
-              <a:buClr>
-                <a:schemeClr val="dk1"/>
-              </a:buClr>
-              <a:buSzPts val="1100"/>
-              <a:buFont typeface="Arial"/>
-              <a:buNone/>
-            </a:pPr>
-            <a:r>
-              <a:rPr b="1" lang="en"/>
-              <a:t>Class</a:t>
-            </a:r>
-            <a:endParaRPr b="1"/>
-          </a:p>
-          <a:p>
-            <a:pPr indent="-342900" lvl="0" marL="457200" rtl="0" algn="l">
-              <a:spcBef>
-                <a:spcPts val="1200"/>
-              </a:spcBef>
-              <a:spcAft>
-                <a:spcPts val="0"/>
-              </a:spcAft>
-              <a:buSzPts val="1800"/>
-              <a:buChar char="●"/>
-            </a:pPr>
-            <a:r>
-              <a:rPr lang="en"/>
-              <a:t>Lecturer: German</a:t>
-            </a:r>
-            <a:endParaRPr/>
-          </a:p>
-          <a:p>
-            <a:pPr indent="-342900" lvl="0" marL="457200" rtl="0" algn="l">
-              <a:spcBef>
-                <a:spcPts val="0"/>
-              </a:spcBef>
-              <a:spcAft>
-                <a:spcPts val="0"/>
-              </a:spcAft>
-              <a:buSzPts val="1800"/>
-              <a:buChar char="●"/>
-            </a:pPr>
-            <a:r>
-              <a:rPr lang="en"/>
-              <a:t>Student: Choice of German or English</a:t>
-            </a:r>
-            <a:endParaRPr/>
-          </a:p>
-          <a:p>
-            <a:pPr indent="0" lvl="0" marL="0" rtl="0" algn="l">
-              <a:spcBef>
-                <a:spcPts val="1200"/>
-              </a:spcBef>
-              <a:spcAft>
-                <a:spcPts val="0"/>
-              </a:spcAft>
-              <a:buClr>
-                <a:schemeClr val="dk1"/>
-              </a:buClr>
-              <a:buSzPts val="1100"/>
-              <a:buFont typeface="Arial"/>
-              <a:buNone/>
-            </a:pPr>
-            <a:r>
-              <a:rPr b="1" lang="en"/>
-              <a:t>Exercise</a:t>
-            </a:r>
-            <a:endParaRPr b="1"/>
-          </a:p>
-          <a:p>
-            <a:pPr indent="-342900" lvl="0" marL="457200" rtl="0" algn="l">
-              <a:spcBef>
-                <a:spcPts val="1200"/>
-              </a:spcBef>
-              <a:spcAft>
-                <a:spcPts val="0"/>
-              </a:spcAft>
-              <a:buSzPts val="1800"/>
-              <a:buChar char="●"/>
-            </a:pPr>
-            <a:r>
-              <a:rPr lang="en"/>
-              <a:t>Instructor: German</a:t>
-            </a:r>
-            <a:endParaRPr/>
-          </a:p>
-          <a:p>
-            <a:pPr indent="-342900" lvl="0" marL="457200" rtl="0" algn="l">
-              <a:spcBef>
-                <a:spcPts val="0"/>
-              </a:spcBef>
-              <a:spcAft>
-                <a:spcPts val="0"/>
-              </a:spcAft>
-              <a:buSzPts val="1800"/>
-              <a:buChar char="●"/>
-            </a:pPr>
-            <a:r>
-              <a:rPr lang="en"/>
-              <a:t>Homework: Choice of German or English</a:t>
-            </a:r>
-            <a:endParaRPr/>
-          </a:p>
-          <a:p>
-            <a:pPr indent="0" lvl="0" marL="0" rtl="0" algn="l">
-              <a:spcBef>
-                <a:spcPts val="1200"/>
-              </a:spcBef>
-              <a:spcAft>
-                <a:spcPts val="1200"/>
-              </a:spcAft>
-              <a:buNone/>
-            </a:pPr>
-            <a:r>
-              <a:t/>
-            </a:r>
-            <a:endParaRPr/>
           </a:p>
         </p:txBody>
       </p:sp>
@@ -6582,7 +6550,7 @@
             </a:pPr>
             <a:r>
               <a:rPr lang="en"/>
-              <a:t>Course Participation (Auditing)</a:t>
+              <a:t>Course Registration / Waitlist</a:t>
             </a:r>
             <a:endParaRPr/>
           </a:p>
@@ -6591,62 +6559,6 @@
       <p:sp>
         <p:nvSpPr>
           <p:cNvPr id="118" name="Google Shape;118;p19"/>
-          <p:cNvSpPr txBox="1"/>
-          <p:nvPr>
-            <p:ph idx="1" type="body"/>
-          </p:nvPr>
-        </p:nvSpPr>
-        <p:spPr>
-          <a:xfrm>
-            <a:off x="274320" y="914400"/>
-            <a:ext cx="8595300" cy="4114800"/>
-          </a:xfrm>
-          <a:prstGeom prst="rect">
-            <a:avLst/>
-          </a:prstGeom>
-        </p:spPr>
-        <p:txBody>
-          <a:bodyPr anchorCtr="0" anchor="t" bIns="0" lIns="0" spcFirstLastPara="1" rIns="0" wrap="square" tIns="0">
-            <a:noAutofit/>
-          </a:bodyPr>
-          <a:lstStyle/>
-          <a:p>
-            <a:pPr indent="0" lvl="0" marL="0" rtl="0" algn="l">
-              <a:spcBef>
-                <a:spcPts val="0"/>
-              </a:spcBef>
-              <a:spcAft>
-                <a:spcPts val="0"/>
-              </a:spcAft>
-              <a:buNone/>
-            </a:pPr>
-            <a:r>
-              <a:rPr lang="en"/>
-              <a:t>The course is provided publicly, you can always audit it</a:t>
-            </a:r>
-            <a:endParaRPr/>
-          </a:p>
-          <a:p>
-            <a:pPr indent="0" lvl="0" marL="0" rtl="0" algn="l">
-              <a:spcBef>
-                <a:spcPts val="1200"/>
-              </a:spcBef>
-              <a:spcAft>
-                <a:spcPts val="1200"/>
-              </a:spcAft>
-              <a:buNone/>
-            </a:pPr>
-            <a:r>
-              <a:rPr lang="en"/>
-              <a:t>Auditing will not give you credit points towards a degree</a:t>
-            </a:r>
-            <a:endParaRPr/>
-          </a:p>
-        </p:txBody>
-      </p:sp>
-      <p:sp>
-        <p:nvSpPr>
-          <p:cNvPr id="119" name="Google Shape;119;p19"/>
           <p:cNvSpPr txBox="1"/>
           <p:nvPr>
             <p:ph idx="12" type="sldNum"/>
@@ -6707,6 +6619,155 @@
               <a:t>https://profriehle.com</a:t>
             </a:r>
             <a:endParaRPr b="0" sz="1000"/>
+          </a:p>
+        </p:txBody>
+      </p:sp>
+      <p:sp>
+        <p:nvSpPr>
+          <p:cNvPr id="119" name="Google Shape;119;p19"/>
+          <p:cNvSpPr txBox="1"/>
+          <p:nvPr>
+            <p:ph idx="1" type="body"/>
+          </p:nvPr>
+        </p:nvSpPr>
+        <p:spPr>
+          <a:xfrm>
+            <a:off x="274320" y="914400"/>
+            <a:ext cx="8595300" cy="4114800"/>
+          </a:xfrm>
+          <a:prstGeom prst="rect">
+            <a:avLst/>
+          </a:prstGeom>
+        </p:spPr>
+        <p:txBody>
+          <a:bodyPr anchorCtr="0" anchor="t" bIns="0" lIns="0" spcFirstLastPara="1" rIns="0" wrap="square" tIns="0">
+            <a:noAutofit/>
+          </a:bodyPr>
+          <a:lstStyle/>
+          <a:p>
+            <a:pPr indent="0" lvl="0" marL="0" rtl="0" algn="l">
+              <a:spcBef>
+                <a:spcPts val="0"/>
+              </a:spcBef>
+              <a:spcAft>
+                <a:spcPts val="0"/>
+              </a:spcAft>
+              <a:buNone/>
+            </a:pPr>
+            <a:r>
+              <a:rPr lang="en"/>
+              <a:t>Students must have passed a (trivial) entrance test</a:t>
+            </a:r>
+            <a:endParaRPr/>
+          </a:p>
+          <a:p>
+            <a:pPr indent="0" lvl="0" marL="0" rtl="0" algn="l">
+              <a:spcBef>
+                <a:spcPts val="1200"/>
+              </a:spcBef>
+              <a:spcAft>
+                <a:spcPts val="0"/>
+              </a:spcAft>
+              <a:buNone/>
+            </a:pPr>
+            <a:r>
+              <a:rPr lang="en" strike="sngStrike"/>
+              <a:t>We use stratified randomized sampling to select students </a:t>
+            </a:r>
+            <a:endParaRPr strike="sngStrike"/>
+          </a:p>
+          <a:p>
+            <a:pPr indent="0" lvl="0" marL="0" rtl="0" algn="l">
+              <a:spcBef>
+                <a:spcPts val="1200"/>
+              </a:spcBef>
+              <a:spcAft>
+                <a:spcPts val="0"/>
+              </a:spcAft>
+              <a:buNone/>
+            </a:pPr>
+            <a:r>
+              <a:rPr lang="en" strike="sngStrike"/>
+              <a:t>Our current student limit for the course is 30 students</a:t>
+            </a:r>
+            <a:endParaRPr strike="sngStrike"/>
+          </a:p>
+          <a:p>
+            <a:pPr indent="0" lvl="0" marL="0" rtl="0" algn="l">
+              <a:spcBef>
+                <a:spcPts val="1200"/>
+              </a:spcBef>
+              <a:spcAft>
+                <a:spcPts val="0"/>
+              </a:spcAft>
+              <a:buNone/>
+            </a:pPr>
+            <a:r>
+              <a:rPr lang="en"/>
+              <a:t>Everyone is required to participate in this first class</a:t>
+            </a:r>
+            <a:endParaRPr/>
+          </a:p>
+          <a:p>
+            <a:pPr indent="0" lvl="0" marL="0" rtl="0" algn="l">
+              <a:spcBef>
+                <a:spcPts val="1200"/>
+              </a:spcBef>
+              <a:spcAft>
+                <a:spcPts val="0"/>
+              </a:spcAft>
+              <a:buNone/>
+            </a:pPr>
+            <a:r>
+              <a:rPr lang="en" strike="sngStrike"/>
+              <a:t>We will inform you after class if you got off the waitlist</a:t>
+            </a:r>
+            <a:endParaRPr strike="sngStrike"/>
+          </a:p>
+          <a:p>
+            <a:pPr indent="0" lvl="0" marL="0" rtl="0" algn="l">
+              <a:spcBef>
+                <a:spcPts val="1200"/>
+              </a:spcBef>
+              <a:spcAft>
+                <a:spcPts val="0"/>
+              </a:spcAft>
+              <a:buNone/>
+            </a:pPr>
+            <a:r>
+              <a:t/>
+            </a:r>
+            <a:endParaRPr/>
+          </a:p>
+          <a:p>
+            <a:pPr indent="0" lvl="0" marL="0" rtl="0" algn="l">
+              <a:spcBef>
+                <a:spcPts val="1200"/>
+              </a:spcBef>
+              <a:spcAft>
+                <a:spcPts val="0"/>
+              </a:spcAft>
+              <a:buNone/>
+            </a:pPr>
+            <a:r>
+              <a:t/>
+            </a:r>
+            <a:endParaRPr/>
+          </a:p>
+          <a:p>
+            <a:pPr indent="0" lvl="0" marL="0" rtl="0" algn="l">
+              <a:spcBef>
+                <a:spcPts val="1200"/>
+              </a:spcBef>
+              <a:spcAft>
+                <a:spcPts val="1200"/>
+              </a:spcAft>
+              <a:buNone/>
+            </a:pPr>
+            <a:r>
+              <a:t/>
+            </a:r>
+            <a:endParaRPr/>
           </a:p>
         </p:txBody>
       </p:sp>
@@ -6769,7 +6830,11 @@
             </a:pPr>
             <a:r>
               <a:rPr lang="en"/>
-              <a:t>Course Registration / Waitlist</a:t>
+              <a:t>Course vs. Exam Registration</a:t>
+            </a:r>
+            <a:r>
+              <a:rPr lang="en"/>
+              <a:t> [1]</a:t>
             </a:r>
             <a:endParaRPr/>
           </a:p>
@@ -6778,6 +6843,158 @@
       <p:sp>
         <p:nvSpPr>
           <p:cNvPr id="125" name="Google Shape;125;p20"/>
+          <p:cNvSpPr txBox="1"/>
+          <p:nvPr>
+            <p:ph idx="1" type="body"/>
+          </p:nvPr>
+        </p:nvSpPr>
+        <p:spPr>
+          <a:xfrm>
+            <a:off x="274320" y="914400"/>
+            <a:ext cx="8595300" cy="4114800"/>
+          </a:xfrm>
+          <a:prstGeom prst="rect">
+            <a:avLst/>
+          </a:prstGeom>
+        </p:spPr>
+        <p:txBody>
+          <a:bodyPr anchorCtr="0" anchor="t" bIns="0" lIns="0" spcFirstLastPara="1" rIns="0" wrap="square" tIns="0">
+            <a:noAutofit/>
+          </a:bodyPr>
+          <a:lstStyle/>
+          <a:p>
+            <a:pPr indent="0" lvl="0" marL="0" rtl="0" algn="l">
+              <a:spcBef>
+                <a:spcPts val="0"/>
+              </a:spcBef>
+              <a:spcAft>
+                <a:spcPts val="0"/>
+              </a:spcAft>
+              <a:buClr>
+                <a:schemeClr val="dk1"/>
+              </a:buClr>
+              <a:buSzPts val="1100"/>
+              <a:buFont typeface="Arial"/>
+              <a:buNone/>
+            </a:pPr>
+            <a:r>
+              <a:rPr lang="en"/>
+              <a:t>Course registration and exam registration are two separate steps</a:t>
+            </a:r>
+            <a:endParaRPr/>
+          </a:p>
+          <a:p>
+            <a:pPr indent="0" lvl="0" marL="0" rtl="0" algn="l">
+              <a:spcBef>
+                <a:spcPts val="1200"/>
+              </a:spcBef>
+              <a:spcAft>
+                <a:spcPts val="0"/>
+              </a:spcAft>
+              <a:buClr>
+                <a:schemeClr val="dk1"/>
+              </a:buClr>
+              <a:buSzPts val="1100"/>
+              <a:buFont typeface="Arial"/>
+              <a:buNone/>
+            </a:pPr>
+            <a:r>
+              <a:rPr lang="en"/>
+              <a:t>If you want to receive a grade</a:t>
+            </a:r>
+            <a:endParaRPr/>
+          </a:p>
+          <a:p>
+            <a:pPr indent="-342900" lvl="0" marL="457200" rtl="0" algn="l">
+              <a:spcBef>
+                <a:spcPts val="1200"/>
+              </a:spcBef>
+              <a:spcAft>
+                <a:spcPts val="0"/>
+              </a:spcAft>
+              <a:buClr>
+                <a:srgbClr val="212121"/>
+              </a:buClr>
+              <a:buSzPts val="1800"/>
+              <a:buChar char="●"/>
+            </a:pPr>
+            <a:r>
+              <a:rPr lang="en">
+                <a:solidFill>
+                  <a:srgbClr val="212121"/>
+                </a:solidFill>
+              </a:rPr>
+              <a:t>You must register through your university’s exam registration system</a:t>
+            </a:r>
+            <a:endParaRPr>
+              <a:solidFill>
+                <a:srgbClr val="212121"/>
+              </a:solidFill>
+            </a:endParaRPr>
+          </a:p>
+          <a:p>
+            <a:pPr indent="-317500" lvl="1" marL="914400" rtl="0" algn="l">
+              <a:spcBef>
+                <a:spcPts val="0"/>
+              </a:spcBef>
+              <a:spcAft>
+                <a:spcPts val="0"/>
+              </a:spcAft>
+              <a:buSzPts val="1400"/>
+              <a:buChar char="○"/>
+            </a:pPr>
+            <a:r>
+              <a:rPr b="1" lang="en"/>
+              <a:t>Your degree program may have split the course into two (VL + UE)</a:t>
+            </a:r>
+            <a:endParaRPr b="1"/>
+          </a:p>
+          <a:p>
+            <a:pPr indent="-317500" lvl="1" marL="914400" rtl="0" algn="l">
+              <a:spcBef>
+                <a:spcPts val="0"/>
+              </a:spcBef>
+              <a:spcAft>
+                <a:spcPts val="0"/>
+              </a:spcAft>
+              <a:buSzPts val="1400"/>
+              <a:buChar char="○"/>
+            </a:pPr>
+            <a:r>
+              <a:rPr b="1" lang="en"/>
+              <a:t>Please check asap that the course is available in your degree program!</a:t>
+            </a:r>
+            <a:endParaRPr b="1">
+              <a:solidFill>
+                <a:srgbClr val="212121"/>
+              </a:solidFill>
+            </a:endParaRPr>
+          </a:p>
+          <a:p>
+            <a:pPr indent="0" lvl="0" marL="0" rtl="0" algn="l">
+              <a:spcBef>
+                <a:spcPts val="1200"/>
+              </a:spcBef>
+              <a:spcAft>
+                <a:spcPts val="1200"/>
+              </a:spcAft>
+              <a:buNone/>
+            </a:pPr>
+            <a:r>
+              <a:rPr lang="en"/>
+              <a:t>Otherwise</a:t>
+            </a:r>
+            <a:r>
+              <a:rPr lang="en"/>
+              <a:t>: No grade</a:t>
+            </a:r>
+            <a:endParaRPr/>
+          </a:p>
+        </p:txBody>
+      </p:sp>
+      <p:sp>
+        <p:nvSpPr>
+          <p:cNvPr id="126" name="Google Shape;126;p20"/>
           <p:cNvSpPr txBox="1"/>
           <p:nvPr>
             <p:ph idx="12" type="sldNum"/>
@@ -6843,23 +7060,25 @@
       </p:sp>
       <p:sp>
         <p:nvSpPr>
-          <p:cNvPr id="126" name="Google Shape;126;p20"/>
+          <p:cNvPr id="127" name="Google Shape;127;p20"/>
           <p:cNvSpPr txBox="1"/>
-          <p:nvPr>
-            <p:ph idx="1" type="body"/>
-          </p:nvPr>
-        </p:nvSpPr>
-        <p:spPr>
-          <a:xfrm>
-            <a:off x="274320" y="914400"/>
-            <a:ext cx="8595300" cy="4114800"/>
+          <p:nvPr/>
+        </p:nvSpPr>
+        <p:spPr>
+          <a:xfrm>
+            <a:off x="0" y="4233672"/>
+            <a:ext cx="7315200" cy="914400"/>
           </a:xfrm>
           <a:prstGeom prst="rect">
             <a:avLst/>
           </a:prstGeom>
+          <a:noFill/>
+          <a:ln>
+            <a:noFill/>
+          </a:ln>
         </p:spPr>
         <p:txBody>
-          <a:bodyPr anchorCtr="0" anchor="t" bIns="0" lIns="0" spcFirstLastPara="1" rIns="0" wrap="square" tIns="0">
+          <a:bodyPr anchorCtr="0" anchor="b" bIns="91425" lIns="91425" spcFirstLastPara="1" rIns="91425" wrap="square" tIns="91425">
             <a:noAutofit/>
           </a:bodyPr>
           <a:lstStyle/>
@@ -6875,116 +7094,7 @@
             </a:pPr>
             <a:r>
               <a:rPr lang="en"/>
-              <a:t>Students must have passed a (trivial) entrance test</a:t>
-            </a:r>
-            <a:endParaRPr/>
-          </a:p>
-          <a:p>
-            <a:pPr indent="0" lvl="0" marL="0" rtl="0" algn="l">
-              <a:spcBef>
-                <a:spcPts val="1200"/>
-              </a:spcBef>
-              <a:spcAft>
-                <a:spcPts val="0"/>
-              </a:spcAft>
-              <a:buNone/>
-            </a:pPr>
-            <a:r>
-              <a:rPr lang="en"/>
-              <a:t>We use stratified randomized sampling to select students </a:t>
-            </a:r>
-            <a:endParaRPr/>
-          </a:p>
-          <a:p>
-            <a:pPr indent="0" lvl="0" marL="0" rtl="0" algn="l">
-              <a:spcBef>
-                <a:spcPts val="1200"/>
-              </a:spcBef>
-              <a:spcAft>
-                <a:spcPts val="0"/>
-              </a:spcAft>
-              <a:buNone/>
-            </a:pPr>
-            <a:r>
-              <a:rPr lang="en"/>
-              <a:t>Our current student limit for the course is 30 students</a:t>
-            </a:r>
-            <a:endParaRPr/>
-          </a:p>
-          <a:p>
-            <a:pPr indent="0" lvl="0" marL="0" rtl="0" algn="l">
-              <a:spcBef>
-                <a:spcPts val="1200"/>
-              </a:spcBef>
-              <a:spcAft>
-                <a:spcPts val="0"/>
-              </a:spcAft>
-              <a:buNone/>
-            </a:pPr>
-            <a:r>
-              <a:rPr lang="en"/>
-              <a:t>Everyone is required to participate in this first class</a:t>
-            </a:r>
-            <a:endParaRPr/>
-          </a:p>
-          <a:p>
-            <a:pPr indent="0" lvl="0" marL="0" rtl="0" algn="l">
-              <a:spcBef>
-                <a:spcPts val="1200"/>
-              </a:spcBef>
-              <a:spcAft>
-                <a:spcPts val="0"/>
-              </a:spcAft>
-              <a:buNone/>
-            </a:pPr>
-            <a:r>
-              <a:rPr lang="en"/>
-              <a:t>We will inform you after class if you got off the waitlist</a:t>
-            </a:r>
-            <a:endParaRPr/>
-          </a:p>
-          <a:p>
-            <a:pPr indent="0" lvl="0" marL="0" rtl="0" algn="l">
-              <a:spcBef>
-                <a:spcPts val="1200"/>
-              </a:spcBef>
-              <a:spcAft>
-                <a:spcPts val="0"/>
-              </a:spcAft>
-              <a:buNone/>
-            </a:pPr>
-            <a:r>
-              <a:t/>
-            </a:r>
-            <a:endParaRPr/>
-          </a:p>
-          <a:p>
-            <a:pPr indent="0" lvl="0" marL="0" rtl="0" algn="l">
-              <a:spcBef>
-                <a:spcPts val="1200"/>
-              </a:spcBef>
-              <a:spcAft>
-                <a:spcPts val="0"/>
-              </a:spcAft>
-              <a:buNone/>
-            </a:pPr>
-            <a:r>
-              <a:t/>
-            </a:r>
-            <a:endParaRPr/>
-          </a:p>
-          <a:p>
-            <a:pPr indent="0" lvl="0" marL="0" rtl="0" algn="l">
-              <a:spcBef>
-                <a:spcPts val="1200"/>
-              </a:spcBef>
-              <a:spcAft>
-                <a:spcPts val="1200"/>
-              </a:spcAft>
-              <a:buNone/>
-            </a:pPr>
-            <a:r>
-              <a:t/>
+              <a:t>[1] German: Prüfungsanmeldung</a:t>
             </a:r>
             <a:endParaRPr/>
           </a:p>
@@ -7003,7 +7113,7 @@
   <p:cSld>
     <p:spTree>
       <p:nvGrpSpPr>
-        <p:cNvPr id="130" name="Shape 130"/>
+        <p:cNvPr id="131" name="Shape 131"/>
         <p:cNvGrpSpPr/>
         <p:nvPr/>
       </p:nvGrpSpPr>
@@ -7017,7 +7127,7 @@
       </p:grpSpPr>
       <p:sp>
         <p:nvSpPr>
-          <p:cNvPr id="131" name="Google Shape;131;p21"/>
+          <p:cNvPr id="132" name="Google Shape;132;p21"/>
           <p:cNvSpPr txBox="1"/>
           <p:nvPr>
             <p:ph type="title"/>
@@ -7049,163 +7159,7 @@
             </a:pPr>
             <a:r>
               <a:rPr lang="en"/>
-              <a:t>Course vs. Exam Registration</a:t>
-            </a:r>
-            <a:r>
-              <a:rPr lang="en"/>
-              <a:t> [1]</a:t>
-            </a:r>
-            <a:endParaRPr/>
-          </a:p>
-        </p:txBody>
-      </p:sp>
-      <p:sp>
-        <p:nvSpPr>
-          <p:cNvPr id="132" name="Google Shape;132;p21"/>
-          <p:cNvSpPr txBox="1"/>
-          <p:nvPr>
-            <p:ph idx="1" type="body"/>
-          </p:nvPr>
-        </p:nvSpPr>
-        <p:spPr>
-          <a:xfrm>
-            <a:off x="274320" y="914400"/>
-            <a:ext cx="8595300" cy="4114800"/>
-          </a:xfrm>
-          <a:prstGeom prst="rect">
-            <a:avLst/>
-          </a:prstGeom>
-        </p:spPr>
-        <p:txBody>
-          <a:bodyPr anchorCtr="0" anchor="t" bIns="0" lIns="0" spcFirstLastPara="1" rIns="0" wrap="square" tIns="0">
-            <a:noAutofit/>
-          </a:bodyPr>
-          <a:lstStyle/>
-          <a:p>
-            <a:pPr indent="0" lvl="0" marL="0" rtl="0" algn="l">
-              <a:spcBef>
-                <a:spcPts val="0"/>
-              </a:spcBef>
-              <a:spcAft>
-                <a:spcPts val="0"/>
-              </a:spcAft>
-              <a:buClr>
-                <a:schemeClr val="dk1"/>
-              </a:buClr>
-              <a:buSzPts val="1100"/>
-              <a:buFont typeface="Arial"/>
-              <a:buNone/>
-            </a:pPr>
-            <a:r>
-              <a:rPr lang="en"/>
-              <a:t>Course registration and exam registration are two separate steps</a:t>
-            </a:r>
-            <a:endParaRPr/>
-          </a:p>
-          <a:p>
-            <a:pPr indent="0" lvl="0" marL="0" rtl="0" algn="l">
-              <a:spcBef>
-                <a:spcPts val="1200"/>
-              </a:spcBef>
-              <a:spcAft>
-                <a:spcPts val="0"/>
-              </a:spcAft>
-              <a:buClr>
-                <a:schemeClr val="dk1"/>
-              </a:buClr>
-              <a:buSzPts val="1100"/>
-              <a:buFont typeface="Arial"/>
-              <a:buNone/>
-            </a:pPr>
-            <a:r>
-              <a:rPr lang="en"/>
-              <a:t>If you want to receive a grade</a:t>
-            </a:r>
-            <a:endParaRPr/>
-          </a:p>
-          <a:p>
-            <a:pPr indent="-342900" lvl="0" marL="457200" rtl="0" algn="l">
-              <a:spcBef>
-                <a:spcPts val="1200"/>
-              </a:spcBef>
-              <a:spcAft>
-                <a:spcPts val="0"/>
-              </a:spcAft>
-              <a:buClr>
-                <a:srgbClr val="212121"/>
-              </a:buClr>
-              <a:buSzPts val="1800"/>
-              <a:buChar char="●"/>
-            </a:pPr>
-            <a:r>
-              <a:rPr lang="en">
-                <a:solidFill>
-                  <a:srgbClr val="212121"/>
-                </a:solidFill>
-              </a:rPr>
-              <a:t>You must register through your university’s exam registration system</a:t>
-            </a:r>
-            <a:endParaRPr>
-              <a:solidFill>
-                <a:srgbClr val="212121"/>
-              </a:solidFill>
-            </a:endParaRPr>
-          </a:p>
-          <a:p>
-            <a:pPr indent="-317500" lvl="1" marL="914400" rtl="0" algn="l">
-              <a:spcBef>
-                <a:spcPts val="0"/>
-              </a:spcBef>
-              <a:spcAft>
-                <a:spcPts val="0"/>
-              </a:spcAft>
-              <a:buSzPts val="1400"/>
-              <a:buChar char="○"/>
-            </a:pPr>
-            <a:r>
-              <a:rPr b="1" lang="en"/>
-              <a:t>Your degree program may have split the course into two (VL + UE)</a:t>
-            </a:r>
-            <a:endParaRPr b="1"/>
-          </a:p>
-          <a:p>
-            <a:pPr indent="-317500" lvl="1" marL="914400" rtl="0" algn="l">
-              <a:spcBef>
-                <a:spcPts val="0"/>
-              </a:spcBef>
-              <a:spcAft>
-                <a:spcPts val="0"/>
-              </a:spcAft>
-              <a:buSzPts val="1400"/>
-              <a:buChar char="○"/>
-            </a:pPr>
-            <a:r>
-              <a:rPr b="1" lang="en"/>
-              <a:t>Please check asap that the course is available in your degree program!</a:t>
-            </a:r>
-            <a:endParaRPr b="1">
-              <a:solidFill>
-                <a:srgbClr val="212121"/>
-              </a:solidFill>
-            </a:endParaRPr>
-          </a:p>
-          <a:p>
-            <a:pPr indent="0" lvl="0" marL="0" rtl="0" algn="l">
-              <a:spcBef>
-                <a:spcPts val="1200"/>
-              </a:spcBef>
-              <a:spcAft>
-                <a:spcPts val="1200"/>
-              </a:spcAft>
-              <a:buNone/>
-            </a:pPr>
-            <a:r>
-              <a:rPr lang="en"/>
-              <a:t>Otherwise</a:t>
-            </a:r>
-            <a:r>
-              <a:rPr lang="en"/>
-              <a:t>: No grade</a:t>
+              <a:t>Expectation Management (Winter 2024/25)</a:t>
             </a:r>
             <a:endParaRPr/>
           </a:p>
@@ -7281,23 +7235,21 @@
         <p:nvSpPr>
           <p:cNvPr id="134" name="Google Shape;134;p21"/>
           <p:cNvSpPr txBox="1"/>
-          <p:nvPr/>
-        </p:nvSpPr>
-        <p:spPr>
-          <a:xfrm>
-            <a:off x="0" y="4233672"/>
-            <a:ext cx="7315200" cy="914400"/>
+          <p:nvPr>
+            <p:ph idx="1" type="body"/>
+          </p:nvPr>
+        </p:nvSpPr>
+        <p:spPr>
+          <a:xfrm>
+            <a:off x="274320" y="914400"/>
+            <a:ext cx="8595300" cy="4114800"/>
           </a:xfrm>
           <a:prstGeom prst="rect">
             <a:avLst/>
           </a:prstGeom>
-          <a:noFill/>
-          <a:ln>
-            <a:noFill/>
-          </a:ln>
         </p:spPr>
         <p:txBody>
-          <a:bodyPr anchorCtr="0" anchor="b" bIns="91425" lIns="91425" spcFirstLastPara="1" rIns="91425" wrap="square" tIns="91425">
+          <a:bodyPr anchorCtr="0" anchor="t" bIns="0" lIns="0" spcFirstLastPara="1" rIns="0" wrap="square" tIns="0">
             <a:noAutofit/>
           </a:bodyPr>
           <a:lstStyle/>
@@ -7313,7 +7265,55 @@
             </a:pPr>
             <a:r>
               <a:rPr lang="en"/>
-              <a:t>[1] German: Prüfungsanmeldung</a:t>
+              <a:t>We skipped ADAP last winter to migrate from Java to Typescript</a:t>
+            </a:r>
+            <a:endParaRPr/>
+          </a:p>
+          <a:p>
+            <a:pPr indent="0" lvl="0" marL="0" rtl="0" algn="l">
+              <a:spcBef>
+                <a:spcPts val="1200"/>
+              </a:spcBef>
+              <a:spcAft>
+                <a:spcPts val="0"/>
+              </a:spcAft>
+              <a:buNone/>
+            </a:pPr>
+            <a:r>
+              <a:rPr lang="en"/>
+              <a:t>We did not finish ADAP preparations; hence this instances is experimental</a:t>
+            </a:r>
+            <a:endParaRPr/>
+          </a:p>
+          <a:p>
+            <a:pPr indent="0" lvl="0" marL="0" rtl="0" algn="l">
+              <a:spcBef>
+                <a:spcPts val="1200"/>
+              </a:spcBef>
+              <a:spcAft>
+                <a:spcPts val="0"/>
+              </a:spcAft>
+              <a:buNone/>
+            </a:pPr>
+            <a:r>
+              <a:rPr lang="en"/>
+              <a:t>You will not receive any homework feedback during the course</a:t>
+            </a:r>
+            <a:endParaRPr/>
+          </a:p>
+          <a:p>
+            <a:pPr indent="0" lvl="0" marL="0" rtl="0" algn="l">
+              <a:spcBef>
+                <a:spcPts val="1200"/>
+              </a:spcBef>
+              <a:spcAft>
+                <a:spcPts val="1200"/>
+              </a:spcAft>
+              <a:buNone/>
+            </a:pPr>
+            <a:r>
+              <a:rPr lang="en"/>
+              <a:t>Please take note of these restrictions; we recommend you try next year</a:t>
             </a:r>
             <a:endParaRPr/>
           </a:p>
@@ -7349,46 +7349,6 @@
           <p:cNvPr id="139" name="Google Shape;139;p22"/>
           <p:cNvSpPr txBox="1"/>
           <p:nvPr>
-            <p:ph type="title"/>
-          </p:nvPr>
-        </p:nvSpPr>
-        <p:spPr>
-          <a:xfrm>
-            <a:off x="0" y="0"/>
-            <a:ext cx="9144000" cy="685800"/>
-          </a:xfrm>
-          <a:prstGeom prst="rect">
-            <a:avLst/>
-          </a:prstGeom>
-        </p:spPr>
-        <p:txBody>
-          <a:bodyPr anchorCtr="0" anchor="ctr" bIns="91425" lIns="274300" spcFirstLastPara="1" rIns="91425" wrap="square" tIns="91425">
-            <a:noAutofit/>
-          </a:bodyPr>
-          <a:lstStyle/>
-          <a:p>
-            <a:pPr indent="0" lvl="0" marL="0" rtl="0" algn="l">
-              <a:spcBef>
-                <a:spcPts val="0"/>
-              </a:spcBef>
-              <a:spcAft>
-                <a:spcPts val="0"/>
-              </a:spcAft>
-              <a:buNone/>
-            </a:pPr>
-            <a:r>
-              <a:rPr lang="en"/>
-              <a:t>Course Organization</a:t>
-            </a:r>
-            <a:endParaRPr/>
-          </a:p>
-        </p:txBody>
-      </p:sp>
-      <p:sp>
-        <p:nvSpPr>
-          <p:cNvPr id="140" name="Google Shape;140;p22"/>
-          <p:cNvSpPr txBox="1"/>
-          <p:nvPr>
             <p:ph idx="1" type="body"/>
           </p:nvPr>
         </p:nvSpPr>
@@ -7509,43 +7469,52 @@
                 <a:spcPts val="1200"/>
               </a:spcBef>
               <a:spcAft>
-                <a:spcPts val="0"/>
-              </a:spcAft>
-              <a:buClr>
-                <a:schemeClr val="dk1"/>
-              </a:buClr>
-              <a:buSzPts val="1100"/>
-              <a:buFont typeface="Arial"/>
-              <a:buNone/>
-            </a:pPr>
-            <a:r>
-              <a:rPr b="1" lang="en"/>
-              <a:t>Project allocation</a:t>
-            </a:r>
-            <a:endParaRPr b="1"/>
-          </a:p>
-          <a:p>
-            <a:pPr indent="-342900" lvl="0" marL="457200" rtl="0" algn="l">
-              <a:spcBef>
                 <a:spcPts val="1200"/>
-              </a:spcBef>
-              <a:spcAft>
-                <a:spcPts val="0"/>
-              </a:spcAft>
-              <a:buSzPts val="1800"/>
-              <a:buChar char="●"/>
-            </a:pPr>
-            <a:r>
-              <a:rPr lang="en"/>
-              <a:t>See </a:t>
-            </a:r>
-            <a:r>
-              <a:rPr b="1" lang="en"/>
-              <a:t>Projects </a:t>
-            </a:r>
-            <a:r>
-              <a:rPr lang="en"/>
-              <a:t>tab on Course organization doc </a:t>
+              </a:spcAft>
+              <a:buNone/>
+            </a:pPr>
+            <a:r>
+              <a:t/>
+            </a:r>
+            <a:endParaRPr/>
+          </a:p>
+        </p:txBody>
+      </p:sp>
+      <p:sp>
+        <p:nvSpPr>
+          <p:cNvPr id="140" name="Google Shape;140;p22"/>
+          <p:cNvSpPr txBox="1"/>
+          <p:nvPr>
+            <p:ph type="title"/>
+          </p:nvPr>
+        </p:nvSpPr>
+        <p:spPr>
+          <a:xfrm>
+            <a:off x="0" y="0"/>
+            <a:ext cx="9144000" cy="685800"/>
+          </a:xfrm>
+          <a:prstGeom prst="rect">
+            <a:avLst/>
+          </a:prstGeom>
+        </p:spPr>
+        <p:txBody>
+          <a:bodyPr anchorCtr="0" anchor="ctr" bIns="91425" lIns="274300" spcFirstLastPara="1" rIns="91425" wrap="square" tIns="91425">
+            <a:noAutofit/>
+          </a:bodyPr>
+          <a:lstStyle/>
+          <a:p>
+            <a:pPr indent="0" lvl="0" marL="0" rtl="0" algn="l">
+              <a:spcBef>
+                <a:spcPts val="0"/>
+              </a:spcBef>
+              <a:spcAft>
+                <a:spcPts val="0"/>
+              </a:spcAft>
+              <a:buNone/>
+            </a:pPr>
+            <a:r>
+              <a:rPr lang="en"/>
+              <a:t>Course Organization</a:t>
             </a:r>
             <a:endParaRPr/>
           </a:p>
@@ -7782,7 +7751,7 @@
             </a:pPr>
             <a:r>
               <a:rPr b="1" lang="en"/>
-              <a:t>Lecture (class)</a:t>
+              <a:t>Class session</a:t>
             </a:r>
             <a:endParaRPr b="1"/>
           </a:p>
@@ -7848,10 +7817,10 @@
               <a:buChar char="●"/>
             </a:pPr>
             <a:r>
-              <a:rPr lang="en"/>
+              <a:rPr lang="en" strike="sngStrike"/>
               <a:t>Discussion of articles</a:t>
             </a:r>
-            <a:endParaRPr/>
+            <a:endParaRPr strike="sngStrike"/>
           </a:p>
           <a:p>
             <a:pPr indent="-342900" lvl="0" marL="457200" rtl="0" algn="l">
@@ -9461,7 +9430,7 @@
             </a:pPr>
             <a:r>
               <a:rPr lang="en"/>
-              <a:t>Lehrveranstaltung = OSS-ADAV-VUE [1] with 4 SWS, 5 ECTS</a:t>
+              <a:t>Lehrveranstaltung = OSS-ADAP-VUE [1] with 4 SWS, 5 ECTS</a:t>
             </a:r>
             <a:endParaRPr/>
           </a:p>
@@ -9528,14 +9497,48 @@
             </a:pPr>
             <a:r>
               <a:rPr lang="en"/>
-              <a:t>As seminar (Bachelor, Master)</a:t>
+              <a:t>As a VL + UE (Bachelor, Master) in den Säulen</a:t>
+            </a:r>
+            <a:endParaRPr/>
+          </a:p>
+          <a:p>
+            <a:pPr indent="-317500" lvl="1" marL="914400" rtl="0" algn="l">
+              <a:spcBef>
+                <a:spcPts val="0"/>
+              </a:spcBef>
+              <a:spcAft>
+                <a:spcPts val="0"/>
+              </a:spcAft>
+              <a:buSzPts val="1400"/>
+              <a:buChar char="○"/>
+            </a:pPr>
+            <a:r>
+              <a:rPr lang="en"/>
+              <a:t>Theorie</a:t>
+            </a:r>
+            <a:endParaRPr/>
+          </a:p>
+          <a:p>
+            <a:pPr indent="-317500" lvl="1" marL="914400" rtl="0" algn="l">
+              <a:spcBef>
+                <a:spcPts val="0"/>
+              </a:spcBef>
+              <a:spcAft>
+                <a:spcPts val="0"/>
+              </a:spcAft>
+              <a:buSzPts val="1400"/>
+              <a:buChar char="○"/>
+            </a:pPr>
+            <a:r>
+              <a:rPr lang="en"/>
+              <a:t>Software</a:t>
             </a:r>
             <a:endParaRPr/>
           </a:p>
           <a:p>
             <a:pPr indent="-342900" lvl="0" marL="457200" rtl="0" algn="l">
               <a:spcBef>
-                <a:spcPts val="0"/>
+                <a:spcPts val="1000"/>
               </a:spcBef>
               <a:spcAft>
                 <a:spcPts val="0"/>
@@ -9545,41 +9548,22 @@
             </a:pPr>
             <a:r>
               <a:rPr lang="en"/>
-              <a:t>As a VL + UE (Bachelor, Master) in den Säulen</a:t>
-            </a:r>
-            <a:endParaRPr/>
-          </a:p>
-          <a:p>
-            <a:pPr indent="-317500" lvl="1" marL="914400" rtl="0" algn="l">
-              <a:spcBef>
-                <a:spcPts val="0"/>
-              </a:spcBef>
-              <a:spcAft>
-                <a:spcPts val="0"/>
-              </a:spcAft>
-              <a:buSzPts val="1400"/>
-              <a:buChar char="○"/>
-            </a:pPr>
-            <a:r>
-              <a:rPr lang="en"/>
-              <a:t>Theoretische Orientierung</a:t>
-            </a:r>
-            <a:endParaRPr/>
-          </a:p>
-          <a:p>
-            <a:pPr indent="-317500" lvl="1" marL="914400" rtl="0" algn="l">
-              <a:spcBef>
-                <a:spcPts val="0"/>
-              </a:spcBef>
-              <a:spcAft>
-                <a:spcPts val="0"/>
-              </a:spcAft>
-              <a:buSzPts val="1400"/>
-              <a:buChar char="○"/>
-            </a:pPr>
-            <a:r>
-              <a:rPr lang="en"/>
-              <a:t>Software-Orientierung</a:t>
+              <a:t>As seminar (Bachelor, Master)</a:t>
+            </a:r>
+            <a:endParaRPr/>
+          </a:p>
+          <a:p>
+            <a:pPr indent="0" lvl="0" marL="0" rtl="0" algn="l">
+              <a:spcBef>
+                <a:spcPts val="1200"/>
+              </a:spcBef>
+              <a:spcAft>
+                <a:spcPts val="1200"/>
+              </a:spcAft>
+              <a:buNone/>
+            </a:pPr>
+            <a:r>
+              <a:t/>
             </a:r>
             <a:endParaRPr/>
           </a:p>

</xml_diff>

<commit_message>
Added B02 + cosmetic fixes
</commit_message>
<xml_diff>
--- a/Lecture slides/ADAP A01 - Introduction.pptx
+++ b/Lecture slides/ADAP A01 - Introduction.pptx
@@ -5907,7 +5907,7 @@
             </a:pPr>
             <a:r>
               <a:rPr lang="en"/>
-              <a:t>Dirk Riehle, Univ. Erlangen</a:t>
+              <a:t>Dirk Riehle, FAU Erlangen</a:t>
             </a:r>
             <a:endParaRPr/>
           </a:p>
@@ -10787,6 +10787,285 @@
 </file>
 
 <file path=ppt/theme/theme1.xml><?xml version="1.0" encoding="utf-8"?>
+<a:theme xmlns:a="http://schemas.openxmlformats.org/drawingml/2006/main" xmlns:r="http://schemas.openxmlformats.org/officeDocument/2006/relationships">
+  <a:themeElements>
+    <a:clrScheme name="Default">
+      <a:dk1>
+        <a:srgbClr val="000000"/>
+      </a:dk1>
+      <a:lt1>
+        <a:srgbClr val="FFFFFF"/>
+      </a:lt1>
+      <a:dk2>
+        <a:srgbClr val="158158"/>
+      </a:dk2>
+      <a:lt2>
+        <a:srgbClr val="F3F3F3"/>
+      </a:lt2>
+      <a:accent1>
+        <a:srgbClr val="058DC7"/>
+      </a:accent1>
+      <a:accent2>
+        <a:srgbClr val="50B432"/>
+      </a:accent2>
+      <a:accent3>
+        <a:srgbClr val="ED561B"/>
+      </a:accent3>
+      <a:accent4>
+        <a:srgbClr val="EDEF00"/>
+      </a:accent4>
+      <a:accent5>
+        <a:srgbClr val="24CBE5"/>
+      </a:accent5>
+      <a:accent6>
+        <a:srgbClr val="64E572"/>
+      </a:accent6>
+      <a:hlink>
+        <a:srgbClr val="2200CC"/>
+      </a:hlink>
+      <a:folHlink>
+        <a:srgbClr val="551A8B"/>
+      </a:folHlink>
+    </a:clrScheme>
+    <a:fontScheme name="Office">
+      <a:majorFont>
+        <a:latin typeface="Arial"/>
+        <a:ea typeface=""/>
+        <a:cs typeface=""/>
+        <a:font script="Jpan" typeface="ＭＳ Ｐゴシック"/>
+        <a:font script="Hang" typeface="맑은 고딕"/>
+        <a:font script="Hans" typeface="宋体"/>
+        <a:font script="Hant" typeface="新細明體"/>
+        <a:font script="Arab" typeface="Times New Roman"/>
+        <a:font script="Hebr" typeface="Times New Roman"/>
+        <a:font script="Thai" typeface="Angsana New"/>
+        <a:font script="Ethi" typeface="Nyala"/>
+        <a:font script="Beng" typeface="Vrinda"/>
+        <a:font script="Gujr" typeface="Shruti"/>
+        <a:font script="Khmr" typeface="MoolBoran"/>
+        <a:font script="Knda" typeface="Tunga"/>
+        <a:font script="Guru" typeface="Raavi"/>
+        <a:font script="Cans" typeface="Euphemia"/>
+        <a:font script="Cher" typeface="Plantagenet Cherokee"/>
+        <a:font script="Yiii" typeface="Microsoft Yi Baiti"/>
+        <a:font script="Tibt" typeface="Microsoft Himalaya"/>
+        <a:font script="Thaa" typeface="MV Boli"/>
+        <a:font script="Deva" typeface="Mangal"/>
+        <a:font script="Telu" typeface="Gautami"/>
+        <a:font script="Taml" typeface="Latha"/>
+        <a:font script="Syrc" typeface="Estrangelo Edessa"/>
+        <a:font script="Orya" typeface="Kalinga"/>
+        <a:font script="Mlym" typeface="Kartika"/>
+        <a:font script="Laoo" typeface="DokChampa"/>
+        <a:font script="Sinh" typeface="Iskoola Pota"/>
+        <a:font script="Mong" typeface="Mongolian Baiti"/>
+        <a:font script="Viet" typeface="Times New Roman"/>
+        <a:font script="Uigh" typeface="Microsoft Uighur"/>
+        <a:font script="Geor" typeface="Sylfaen"/>
+      </a:majorFont>
+      <a:minorFont>
+        <a:latin typeface="Arial"/>
+        <a:ea typeface=""/>
+        <a:cs typeface=""/>
+        <a:font script="Jpan" typeface="ＭＳ Ｐゴシック"/>
+        <a:font script="Hang" typeface="맑은 고딕"/>
+        <a:font script="Hans" typeface="宋体"/>
+        <a:font script="Hant" typeface="新細明體"/>
+        <a:font script="Arab" typeface="Arial"/>
+        <a:font script="Hebr" typeface="Arial"/>
+        <a:font script="Thai" typeface="Cordia New"/>
+        <a:font script="Ethi" typeface="Nyala"/>
+        <a:font script="Beng" typeface="Vrinda"/>
+        <a:font script="Gujr" typeface="Shruti"/>
+        <a:font script="Khmr" typeface="DaunPenh"/>
+        <a:font script="Knda" typeface="Tunga"/>
+        <a:font script="Guru" typeface="Raavi"/>
+        <a:font script="Cans" typeface="Euphemia"/>
+        <a:font script="Cher" typeface="Plantagenet Cherokee"/>
+        <a:font script="Yiii" typeface="Microsoft Yi Baiti"/>
+        <a:font script="Tibt" typeface="Microsoft Himalaya"/>
+        <a:font script="Thaa" typeface="MV Boli"/>
+        <a:font script="Deva" typeface="Mangal"/>
+        <a:font script="Telu" typeface="Gautami"/>
+        <a:font script="Taml" typeface="Latha"/>
+        <a:font script="Syrc" typeface="Estrangelo Edessa"/>
+        <a:font script="Orya" typeface="Kalinga"/>
+        <a:font script="Mlym" typeface="Kartika"/>
+        <a:font script="Laoo" typeface="DokChampa"/>
+        <a:font script="Sinh" typeface="Iskoola Pota"/>
+        <a:font script="Mong" typeface="Mongolian Baiti"/>
+        <a:font script="Viet" typeface="Arial"/>
+        <a:font script="Uigh" typeface="Microsoft Uighur"/>
+        <a:font script="Geor" typeface="Sylfaen"/>
+      </a:minorFont>
+    </a:fontScheme>
+    <a:fmtScheme name="Office">
+      <a:fillStyleLst>
+        <a:solidFill>
+          <a:schemeClr val="phClr"/>
+        </a:solidFill>
+        <a:gradFill rotWithShape="1">
+          <a:gsLst>
+            <a:gs pos="0">
+              <a:schemeClr val="phClr">
+                <a:tint val="50000"/>
+                <a:satMod val="300000"/>
+              </a:schemeClr>
+            </a:gs>
+            <a:gs pos="35000">
+              <a:schemeClr val="phClr">
+                <a:tint val="37000"/>
+                <a:satMod val="300000"/>
+              </a:schemeClr>
+            </a:gs>
+            <a:gs pos="100000">
+              <a:schemeClr val="phClr">
+                <a:tint val="15000"/>
+                <a:satMod val="350000"/>
+              </a:schemeClr>
+            </a:gs>
+          </a:gsLst>
+          <a:lin ang="16200000" scaled="1"/>
+        </a:gradFill>
+        <a:gradFill rotWithShape="1">
+          <a:gsLst>
+            <a:gs pos="0">
+              <a:schemeClr val="phClr">
+                <a:tint val="100000"/>
+                <a:shade val="100000"/>
+                <a:satMod val="130000"/>
+              </a:schemeClr>
+            </a:gs>
+            <a:gs pos="100000">
+              <a:schemeClr val="phClr">
+                <a:tint val="50000"/>
+                <a:shade val="100000"/>
+                <a:satMod val="350000"/>
+              </a:schemeClr>
+            </a:gs>
+          </a:gsLst>
+          <a:lin ang="16200000" scaled="0"/>
+        </a:gradFill>
+      </a:fillStyleLst>
+      <a:lnStyleLst>
+        <a:ln w="9525" cap="flat" cmpd="sng" algn="ctr">
+          <a:solidFill>
+            <a:schemeClr val="phClr">
+              <a:shade val="95000"/>
+              <a:satMod val="105000"/>
+            </a:schemeClr>
+          </a:solidFill>
+          <a:prstDash val="solid"/>
+        </a:ln>
+        <a:ln w="25400" cap="flat" cmpd="sng" algn="ctr">
+          <a:solidFill>
+            <a:schemeClr val="phClr"/>
+          </a:solidFill>
+          <a:prstDash val="solid"/>
+        </a:ln>
+        <a:ln w="38100" cap="flat" cmpd="sng" algn="ctr">
+          <a:solidFill>
+            <a:schemeClr val="phClr"/>
+          </a:solidFill>
+          <a:prstDash val="solid"/>
+        </a:ln>
+      </a:lnStyleLst>
+      <a:effectStyleLst>
+        <a:effectStyle>
+          <a:effectLst>
+            <a:outerShdw blurRad="40000" dist="20000" dir="5400000" rotWithShape="0">
+              <a:srgbClr val="000000">
+                <a:alpha val="38000"/>
+              </a:srgbClr>
+            </a:outerShdw>
+          </a:effectLst>
+        </a:effectStyle>
+        <a:effectStyle>
+          <a:effectLst>
+            <a:outerShdw blurRad="40000" dist="23000" dir="5400000" rotWithShape="0">
+              <a:srgbClr val="000000">
+                <a:alpha val="35000"/>
+              </a:srgbClr>
+            </a:outerShdw>
+          </a:effectLst>
+        </a:effectStyle>
+        <a:effectStyle>
+          <a:effectLst>
+            <a:outerShdw blurRad="40000" dist="23000" dir="5400000" rotWithShape="0">
+              <a:srgbClr val="000000">
+                <a:alpha val="35000"/>
+              </a:srgbClr>
+            </a:outerShdw>
+          </a:effectLst>
+          <a:scene3d>
+            <a:camera prst="orthographicFront">
+              <a:rot lat="0" lon="0" rev="0"/>
+            </a:camera>
+            <a:lightRig rig="threePt" dir="t">
+              <a:rot lat="0" lon="0" rev="1200000"/>
+            </a:lightRig>
+          </a:scene3d>
+          <a:sp3d>
+            <a:bevelT w="63500" h="25400"/>
+          </a:sp3d>
+        </a:effectStyle>
+      </a:effectStyleLst>
+      <a:bgFillStyleLst>
+        <a:solidFill>
+          <a:schemeClr val="phClr"/>
+        </a:solidFill>
+        <a:gradFill rotWithShape="1">
+          <a:gsLst>
+            <a:gs pos="0">
+              <a:schemeClr val="phClr">
+                <a:tint val="40000"/>
+                <a:satMod val="350000"/>
+              </a:schemeClr>
+            </a:gs>
+            <a:gs pos="40000">
+              <a:schemeClr val="phClr">
+                <a:tint val="45000"/>
+                <a:shade val="99000"/>
+                <a:satMod val="350000"/>
+              </a:schemeClr>
+            </a:gs>
+            <a:gs pos="100000">
+              <a:schemeClr val="phClr">
+                <a:shade val="20000"/>
+                <a:satMod val="255000"/>
+              </a:schemeClr>
+            </a:gs>
+          </a:gsLst>
+          <a:path path="circle">
+            <a:fillToRect l="50000" t="-80000" r="50000" b="180000"/>
+          </a:path>
+        </a:gradFill>
+        <a:gradFill rotWithShape="1">
+          <a:gsLst>
+            <a:gs pos="0">
+              <a:schemeClr val="phClr">
+                <a:tint val="80000"/>
+                <a:satMod val="300000"/>
+              </a:schemeClr>
+            </a:gs>
+            <a:gs pos="100000">
+              <a:schemeClr val="phClr">
+                <a:shade val="30000"/>
+                <a:satMod val="200000"/>
+              </a:schemeClr>
+            </a:gs>
+          </a:gsLst>
+          <a:path path="circle">
+            <a:fillToRect l="50000" t="50000" r="50000" b="50000"/>
+          </a:path>
+        </a:gradFill>
+      </a:bgFillStyleLst>
+    </a:fmtScheme>
+  </a:themeElements>
+</a:theme>
+</file>
+
+<file path=ppt/theme/theme2.xml><?xml version="1.0" encoding="utf-8"?>
 <a:theme xmlns:a="http://schemas.openxmlformats.org/drawingml/2006/main" xmlns:r="http://schemas.openxmlformats.org/officeDocument/2006/relationships" name="ADAP Slides Template">
   <a:themeElements>
     <a:clrScheme name="Simple Light">
@@ -11063,283 +11342,4 @@
     </a:fmtScheme>
   </a:themeElements>
 </a:theme>
-</file>
-
-<file path=ppt/theme/theme2.xml><?xml version="1.0" encoding="utf-8"?>
-<a:theme xmlns:a="http://schemas.openxmlformats.org/drawingml/2006/main" xmlns:r="http://schemas.openxmlformats.org/officeDocument/2006/relationships">
-  <a:themeElements>
-    <a:clrScheme name="Default">
-      <a:dk1>
-        <a:srgbClr val="000000"/>
-      </a:dk1>
-      <a:lt1>
-        <a:srgbClr val="FFFFFF"/>
-      </a:lt1>
-      <a:dk2>
-        <a:srgbClr val="158158"/>
-      </a:dk2>
-      <a:lt2>
-        <a:srgbClr val="F3F3F3"/>
-      </a:lt2>
-      <a:accent1>
-        <a:srgbClr val="058DC7"/>
-      </a:accent1>
-      <a:accent2>
-        <a:srgbClr val="50B432"/>
-      </a:accent2>
-      <a:accent3>
-        <a:srgbClr val="ED561B"/>
-      </a:accent3>
-      <a:accent4>
-        <a:srgbClr val="EDEF00"/>
-      </a:accent4>
-      <a:accent5>
-        <a:srgbClr val="24CBE5"/>
-      </a:accent5>
-      <a:accent6>
-        <a:srgbClr val="64E572"/>
-      </a:accent6>
-      <a:hlink>
-        <a:srgbClr val="2200CC"/>
-      </a:hlink>
-      <a:folHlink>
-        <a:srgbClr val="551A8B"/>
-      </a:folHlink>
-    </a:clrScheme>
-    <a:fontScheme name="Office">
-      <a:majorFont>
-        <a:latin typeface="Arial"/>
-        <a:ea typeface=""/>
-        <a:cs typeface=""/>
-        <a:font script="Jpan" typeface="ＭＳ Ｐゴシック"/>
-        <a:font script="Hang" typeface="맑은 고딕"/>
-        <a:font script="Hans" typeface="宋体"/>
-        <a:font script="Hant" typeface="新細明體"/>
-        <a:font script="Arab" typeface="Times New Roman"/>
-        <a:font script="Hebr" typeface="Times New Roman"/>
-        <a:font script="Thai" typeface="Angsana New"/>
-        <a:font script="Ethi" typeface="Nyala"/>
-        <a:font script="Beng" typeface="Vrinda"/>
-        <a:font script="Gujr" typeface="Shruti"/>
-        <a:font script="Khmr" typeface="MoolBoran"/>
-        <a:font script="Knda" typeface="Tunga"/>
-        <a:font script="Guru" typeface="Raavi"/>
-        <a:font script="Cans" typeface="Euphemia"/>
-        <a:font script="Cher" typeface="Plantagenet Cherokee"/>
-        <a:font script="Yiii" typeface="Microsoft Yi Baiti"/>
-        <a:font script="Tibt" typeface="Microsoft Himalaya"/>
-        <a:font script="Thaa" typeface="MV Boli"/>
-        <a:font script="Deva" typeface="Mangal"/>
-        <a:font script="Telu" typeface="Gautami"/>
-        <a:font script="Taml" typeface="Latha"/>
-        <a:font script="Syrc" typeface="Estrangelo Edessa"/>
-        <a:font script="Orya" typeface="Kalinga"/>
-        <a:font script="Mlym" typeface="Kartika"/>
-        <a:font script="Laoo" typeface="DokChampa"/>
-        <a:font script="Sinh" typeface="Iskoola Pota"/>
-        <a:font script="Mong" typeface="Mongolian Baiti"/>
-        <a:font script="Viet" typeface="Times New Roman"/>
-        <a:font script="Uigh" typeface="Microsoft Uighur"/>
-        <a:font script="Geor" typeface="Sylfaen"/>
-      </a:majorFont>
-      <a:minorFont>
-        <a:latin typeface="Arial"/>
-        <a:ea typeface=""/>
-        <a:cs typeface=""/>
-        <a:font script="Jpan" typeface="ＭＳ Ｐゴシック"/>
-        <a:font script="Hang" typeface="맑은 고딕"/>
-        <a:font script="Hans" typeface="宋体"/>
-        <a:font script="Hant" typeface="新細明體"/>
-        <a:font script="Arab" typeface="Arial"/>
-        <a:font script="Hebr" typeface="Arial"/>
-        <a:font script="Thai" typeface="Cordia New"/>
-        <a:font script="Ethi" typeface="Nyala"/>
-        <a:font script="Beng" typeface="Vrinda"/>
-        <a:font script="Gujr" typeface="Shruti"/>
-        <a:font script="Khmr" typeface="DaunPenh"/>
-        <a:font script="Knda" typeface="Tunga"/>
-        <a:font script="Guru" typeface="Raavi"/>
-        <a:font script="Cans" typeface="Euphemia"/>
-        <a:font script="Cher" typeface="Plantagenet Cherokee"/>
-        <a:font script="Yiii" typeface="Microsoft Yi Baiti"/>
-        <a:font script="Tibt" typeface="Microsoft Himalaya"/>
-        <a:font script="Thaa" typeface="MV Boli"/>
-        <a:font script="Deva" typeface="Mangal"/>
-        <a:font script="Telu" typeface="Gautami"/>
-        <a:font script="Taml" typeface="Latha"/>
-        <a:font script="Syrc" typeface="Estrangelo Edessa"/>
-        <a:font script="Orya" typeface="Kalinga"/>
-        <a:font script="Mlym" typeface="Kartika"/>
-        <a:font script="Laoo" typeface="DokChampa"/>
-        <a:font script="Sinh" typeface="Iskoola Pota"/>
-        <a:font script="Mong" typeface="Mongolian Baiti"/>
-        <a:font script="Viet" typeface="Arial"/>
-        <a:font script="Uigh" typeface="Microsoft Uighur"/>
-        <a:font script="Geor" typeface="Sylfaen"/>
-      </a:minorFont>
-    </a:fontScheme>
-    <a:fmtScheme name="Office">
-      <a:fillStyleLst>
-        <a:solidFill>
-          <a:schemeClr val="phClr"/>
-        </a:solidFill>
-        <a:gradFill rotWithShape="1">
-          <a:gsLst>
-            <a:gs pos="0">
-              <a:schemeClr val="phClr">
-                <a:tint val="50000"/>
-                <a:satMod val="300000"/>
-              </a:schemeClr>
-            </a:gs>
-            <a:gs pos="35000">
-              <a:schemeClr val="phClr">
-                <a:tint val="37000"/>
-                <a:satMod val="300000"/>
-              </a:schemeClr>
-            </a:gs>
-            <a:gs pos="100000">
-              <a:schemeClr val="phClr">
-                <a:tint val="15000"/>
-                <a:satMod val="350000"/>
-              </a:schemeClr>
-            </a:gs>
-          </a:gsLst>
-          <a:lin ang="16200000" scaled="1"/>
-        </a:gradFill>
-        <a:gradFill rotWithShape="1">
-          <a:gsLst>
-            <a:gs pos="0">
-              <a:schemeClr val="phClr">
-                <a:tint val="100000"/>
-                <a:shade val="100000"/>
-                <a:satMod val="130000"/>
-              </a:schemeClr>
-            </a:gs>
-            <a:gs pos="100000">
-              <a:schemeClr val="phClr">
-                <a:tint val="50000"/>
-                <a:shade val="100000"/>
-                <a:satMod val="350000"/>
-              </a:schemeClr>
-            </a:gs>
-          </a:gsLst>
-          <a:lin ang="16200000" scaled="0"/>
-        </a:gradFill>
-      </a:fillStyleLst>
-      <a:lnStyleLst>
-        <a:ln w="9525" cap="flat" cmpd="sng" algn="ctr">
-          <a:solidFill>
-            <a:schemeClr val="phClr">
-              <a:shade val="95000"/>
-              <a:satMod val="105000"/>
-            </a:schemeClr>
-          </a:solidFill>
-          <a:prstDash val="solid"/>
-        </a:ln>
-        <a:ln w="25400" cap="flat" cmpd="sng" algn="ctr">
-          <a:solidFill>
-            <a:schemeClr val="phClr"/>
-          </a:solidFill>
-          <a:prstDash val="solid"/>
-        </a:ln>
-        <a:ln w="38100" cap="flat" cmpd="sng" algn="ctr">
-          <a:solidFill>
-            <a:schemeClr val="phClr"/>
-          </a:solidFill>
-          <a:prstDash val="solid"/>
-        </a:ln>
-      </a:lnStyleLst>
-      <a:effectStyleLst>
-        <a:effectStyle>
-          <a:effectLst>
-            <a:outerShdw blurRad="40000" dist="20000" dir="5400000" rotWithShape="0">
-              <a:srgbClr val="000000">
-                <a:alpha val="38000"/>
-              </a:srgbClr>
-            </a:outerShdw>
-          </a:effectLst>
-        </a:effectStyle>
-        <a:effectStyle>
-          <a:effectLst>
-            <a:outerShdw blurRad="40000" dist="23000" dir="5400000" rotWithShape="0">
-              <a:srgbClr val="000000">
-                <a:alpha val="35000"/>
-              </a:srgbClr>
-            </a:outerShdw>
-          </a:effectLst>
-        </a:effectStyle>
-        <a:effectStyle>
-          <a:effectLst>
-            <a:outerShdw blurRad="40000" dist="23000" dir="5400000" rotWithShape="0">
-              <a:srgbClr val="000000">
-                <a:alpha val="35000"/>
-              </a:srgbClr>
-            </a:outerShdw>
-          </a:effectLst>
-          <a:scene3d>
-            <a:camera prst="orthographicFront">
-              <a:rot lat="0" lon="0" rev="0"/>
-            </a:camera>
-            <a:lightRig rig="threePt" dir="t">
-              <a:rot lat="0" lon="0" rev="1200000"/>
-            </a:lightRig>
-          </a:scene3d>
-          <a:sp3d>
-            <a:bevelT w="63500" h="25400"/>
-          </a:sp3d>
-        </a:effectStyle>
-      </a:effectStyleLst>
-      <a:bgFillStyleLst>
-        <a:solidFill>
-          <a:schemeClr val="phClr"/>
-        </a:solidFill>
-        <a:gradFill rotWithShape="1">
-          <a:gsLst>
-            <a:gs pos="0">
-              <a:schemeClr val="phClr">
-                <a:tint val="40000"/>
-                <a:satMod val="350000"/>
-              </a:schemeClr>
-            </a:gs>
-            <a:gs pos="40000">
-              <a:schemeClr val="phClr">
-                <a:tint val="45000"/>
-                <a:shade val="99000"/>
-                <a:satMod val="350000"/>
-              </a:schemeClr>
-            </a:gs>
-            <a:gs pos="100000">
-              <a:schemeClr val="phClr">
-                <a:shade val="20000"/>
-                <a:satMod val="255000"/>
-              </a:schemeClr>
-            </a:gs>
-          </a:gsLst>
-          <a:path path="circle">
-            <a:fillToRect l="50000" t="-80000" r="50000" b="180000"/>
-          </a:path>
-        </a:gradFill>
-        <a:gradFill rotWithShape="1">
-          <a:gsLst>
-            <a:gs pos="0">
-              <a:schemeClr val="phClr">
-                <a:tint val="80000"/>
-                <a:satMod val="300000"/>
-              </a:schemeClr>
-            </a:gs>
-            <a:gs pos="100000">
-              <a:schemeClr val="phClr">
-                <a:shade val="30000"/>
-                <a:satMod val="200000"/>
-              </a:schemeClr>
-            </a:gs>
-          </a:gsLst>
-          <a:path path="circle">
-            <a:fillToRect l="50000" t="50000" r="50000" b="50000"/>
-          </a:path>
-        </a:gradFill>
-      </a:bgFillStyleLst>
-    </a:fmtScheme>
-  </a:themeElements>
-</a:theme>
 </file>
</xml_diff>